<commit_message>
TG: Finale anpassung präsentation
</commit_message>
<xml_diff>
--- a/Dokumente/Coaching/2016-12-21/2016-12-07 Rollentätigkeit Thomas Gorgels.pptx
+++ b/Dokumente/Coaching/2016-12-21/2016-12-07 Rollentätigkeit Thomas Gorgels.pptx
@@ -257,7 +257,7 @@
               <a:pPr>
                 <a:defRPr/>
               </a:pPr>
-              <a:t>21.12.2016</a:t>
+              <a:t>21.12.16</a:t>
             </a:fld>
             <a:endParaRPr lang="de-DE"/>
           </a:p>
@@ -448,7 +448,7 @@
               <a:pPr>
                 <a:defRPr/>
               </a:pPr>
-              <a:t>21.12.2016</a:t>
+              <a:t>21.12.16</a:t>
             </a:fld>
             <a:endParaRPr lang="de-DE"/>
           </a:p>
@@ -4096,6 +4096,14 @@
               </a:rPr>
               <a:t>Gorgels</a:t>
             </a:r>
+            <a:r>
+              <a:rPr lang="de-DE" altLang="de-DE" dirty="0">
+                <a:solidFill>
+                  <a:srgbClr val="00B1AC"/>
+                </a:solidFill>
+              </a:rPr>
+              <a:t/>
+            </a:r>
             <a:br>
               <a:rPr lang="de-DE" altLang="de-DE" dirty="0">
                 <a:solidFill>
@@ -4106,6 +4114,10 @@
             <a:r>
               <a:rPr lang="de-DE" altLang="de-DE" sz="3200" dirty="0"/>
               <a:t>Technologiemanager</a:t>
+            </a:r>
+            <a:r>
+              <a:rPr lang="de-DE" altLang="de-DE" dirty="0"/>
+              <a:t/>
             </a:r>
             <a:br>
               <a:rPr lang="de-DE" altLang="de-DE" dirty="0"/>
@@ -4471,12 +4483,12 @@
               <a:buAutoNum type="arabicPeriod"/>
             </a:pPr>
             <a:r>
-              <a:rPr lang="de-DE" altLang="de-DE" dirty="0" err="1"/>
-              <a:t>Abhänigkeit</a:t>
+              <a:rPr lang="de-DE" altLang="de-DE" dirty="0" smtClean="0"/>
+              <a:t>Abhängigkeit </a:t>
             </a:r>
             <a:r>
               <a:rPr lang="de-DE" altLang="de-DE" dirty="0"/>
-              <a:t> von anderen Rollen</a:t>
+              <a:t>von anderen Rollen</a:t>
             </a:r>
           </a:p>
           <a:p>
@@ -4525,6 +4537,13 @@
   <p:clrMapOvr>
     <a:masterClrMapping/>
   </p:clrMapOvr>
+  <p:timing>
+    <p:tnLst>
+      <p:par>
+        <p:cTn id="1" dur="indefinite" restart="never" nodeType="tmRoot"/>
+      </p:par>
+    </p:tnLst>
+  </p:timing>
 </p:sld>
 </file>
 
@@ -4577,6 +4596,10 @@
             <a:br>
               <a:rPr lang="de-DE" sz="2000" dirty="0"/>
             </a:br>
+            <a:r>
+              <a:rPr lang="de-DE" sz="2000" dirty="0"/>
+              <a:t/>
+            </a:r>
             <a:br>
               <a:rPr lang="de-DE" sz="2000" dirty="0"/>
             </a:br>
@@ -4594,6 +4617,10 @@
             <a:br>
               <a:rPr lang="de-DE" sz="2000" dirty="0"/>
             </a:br>
+            <a:r>
+              <a:rPr lang="de-DE" sz="2000" dirty="0"/>
+              <a:t/>
+            </a:r>
             <a:br>
               <a:rPr lang="de-DE" sz="2000" dirty="0"/>
             </a:br>
@@ -4696,24 +4723,21 @@
               <a:buChar char="•"/>
             </a:pPr>
             <a:r>
-              <a:rPr lang="de-DE" sz="2000" dirty="0"/>
-              <a:t>Erstellen der </a:t>
-            </a:r>
-            <a:r>
-              <a:rPr lang="de-DE" sz="2000" dirty="0" err="1"/>
-              <a:t>Mockups</a:t>
-            </a:r>
-            <a:r>
-              <a:rPr lang="de-DE" sz="2000" dirty="0"/>
-              <a:t> (Fokus auf Format im Lastenheft)</a:t>
-            </a:r>
+              <a:rPr lang="de-DE" sz="2000" dirty="0" smtClean="0"/>
+              <a:t>Systemdesign </a:t>
+            </a:r>
+            <a:r>
+              <a:rPr lang="de-DE" sz="2000" dirty="0" err="1" smtClean="0"/>
+              <a:t>Mockup</a:t>
+            </a:r>
+            <a:endParaRPr lang="de-DE" sz="2000" dirty="0" smtClean="0"/>
           </a:p>
           <a:p>
             <a:pPr>
               <a:buFont typeface="Arial" panose="020B0604020202020204" pitchFamily="34" charset="0"/>
               <a:buChar char="•"/>
             </a:pPr>
-            <a:endParaRPr lang="de-DE" sz="2000" dirty="0"/>
+            <a:endParaRPr lang="de-DE" sz="2000" dirty="0" smtClean="0"/>
           </a:p>
           <a:p>
             <a:pPr>
@@ -4721,12 +4745,24 @@
               <a:buChar char="•"/>
             </a:pPr>
             <a:r>
+              <a:rPr lang="de-DE" sz="2000" dirty="0" smtClean="0"/>
+              <a:t>Dialoge im Lastenheft</a:t>
+            </a:r>
+            <a:endParaRPr lang="de-DE" sz="2000" dirty="0"/>
+          </a:p>
+          <a:p>
+            <a:pPr>
+              <a:buFont typeface="Arial" panose="020B0604020202020204" pitchFamily="34" charset="0"/>
+              <a:buChar char="•"/>
+            </a:pPr>
+            <a:r>
               <a:rPr lang="de-DE" sz="2000" dirty="0"/>
-              <a:t>Lastenheft Kapitel 9-12</a:t>
-            </a:r>
-            <a:br>
-              <a:rPr lang="de-DE" sz="2000" dirty="0"/>
-            </a:br>
+              <a:t>Lastenheft Kapitel </a:t>
+            </a:r>
+            <a:r>
+              <a:rPr lang="de-DE" sz="2000" dirty="0" smtClean="0"/>
+              <a:t>9-12</a:t>
+            </a:r>
             <a:endParaRPr lang="de-DE" sz="2000" dirty="0"/>
           </a:p>
           <a:p>
@@ -4786,6 +4822,13 @@
   <p:clrMapOvr>
     <a:masterClrMapping/>
   </p:clrMapOvr>
+  <p:timing>
+    <p:tnLst>
+      <p:par>
+        <p:cTn id="1" dur="indefinite" restart="never" nodeType="tmRoot"/>
+      </p:par>
+    </p:tnLst>
+  </p:timing>
 </p:sld>
 </file>
 
@@ -4869,8 +4912,21 @@
             </a:pPr>
             <a:r>
               <a:rPr lang="de-DE" dirty="0"/>
-              <a:t>Weiterhin Anlaufstelle für technische fragen und Probleme</a:t>
-            </a:r>
+              <a:t>Weiterhin Anlaufstelle für technische </a:t>
+            </a:r>
+            <a:r>
+              <a:rPr lang="de-DE" dirty="0" smtClean="0"/>
+              <a:t>Fragen </a:t>
+            </a:r>
+            <a:r>
+              <a:rPr lang="de-DE" dirty="0"/>
+              <a:t>und </a:t>
+            </a:r>
+            <a:r>
+              <a:rPr lang="de-DE" dirty="0" smtClean="0"/>
+              <a:t>Probleme im Server-Bereich</a:t>
+            </a:r>
+            <a:endParaRPr lang="de-DE" dirty="0"/>
           </a:p>
           <a:p>
             <a:pPr marL="342900" indent="-342900">
@@ -4886,8 +4942,9 @@
             </a:pPr>
             <a:r>
               <a:rPr lang="de-DE" dirty="0"/>
-              <a:t>Implementierung </a:t>
-            </a:r>
+              <a:t>Koordinierung der Aufgaben im Serverbereich </a:t>
+            </a:r>
+            <a:endParaRPr lang="de-DE" dirty="0" smtClean="0"/>
           </a:p>
           <a:p>
             <a:pPr marL="342900" indent="-342900">
@@ -4902,11 +4959,17 @@
               <a:buChar char="•"/>
             </a:pPr>
             <a:r>
-              <a:rPr lang="de-DE" dirty="0"/>
-              <a:t>Koordinierung der Aufgaben im Serverbereich </a:t>
-            </a:r>
-          </a:p>
-          <a:p>
+              <a:rPr lang="de-DE" dirty="0" smtClean="0"/>
+              <a:t>Bugs fixen (meiner </a:t>
+            </a:r>
+            <a:r>
+              <a:rPr lang="de-DE" dirty="0" err="1" smtClean="0"/>
+              <a:t>Implemtierung</a:t>
+            </a:r>
+            <a:r>
+              <a:rPr lang="de-DE" dirty="0" smtClean="0"/>
+              <a:t>)</a:t>
+            </a:r>
             <a:endParaRPr lang="de-DE" dirty="0"/>
           </a:p>
           <a:p>
@@ -4931,6 +4994,13 @@
   <p:clrMapOvr>
     <a:masterClrMapping/>
   </p:clrMapOvr>
+  <p:timing>
+    <p:tnLst>
+      <p:par>
+        <p:cTn id="1" dur="indefinite" restart="never" nodeType="tmRoot"/>
+      </p:par>
+    </p:tnLst>
+  </p:timing>
 </p:sld>
 </file>
 
@@ -4974,6 +5044,10 @@
               </a:rPr>
               <a:t>Zeitaufteilung</a:t>
             </a:r>
+            <a:r>
+              <a:rPr lang="de-DE" dirty="0"/>
+              <a:t/>
+            </a:r>
             <a:br>
               <a:rPr lang="de-DE" dirty="0"/>
             </a:br>
@@ -5006,7 +5080,7 @@
           <a:graphicData uri="http://schemas.openxmlformats.org/presentationml/2006/ole">
             <mc:AlternateContent xmlns:mc="http://schemas.openxmlformats.org/markup-compatibility/2006">
               <mc:Choice xmlns:v="urn:schemas-microsoft-com:vml" Requires="v">
-                <p:oleObj spid="_x0000_s1034" name="Worksheet" r:id="rId3" imgW="12544311" imgH="2486080" progId="Excel.Sheet.12">
+                <p:oleObj spid="_x0000_s1040" name="Worksheet" r:id="rId3" imgW="12544311" imgH="2486080" progId="Excel.Sheet.12">
                   <p:embed/>
                 </p:oleObj>
               </mc:Choice>
@@ -5295,7 +5369,15 @@
             </a:pPr>
             <a:r>
               <a:rPr lang="de-DE" sz="2000" dirty="0"/>
-              <a:t>Aufgaben wurden jedoch erfüllt!</a:t>
+              <a:t>Aufgaben wurden </a:t>
+            </a:r>
+            <a:r>
+              <a:rPr lang="de-DE" sz="2000" dirty="0" smtClean="0"/>
+              <a:t>erfüllt</a:t>
+            </a:r>
+            <a:r>
+              <a:rPr lang="de-DE" sz="2000" dirty="0"/>
+              <a:t>!</a:t>
             </a:r>
           </a:p>
           <a:p>
@@ -5358,8 +5440,13 @@
             </a:pPr>
             <a:r>
               <a:rPr lang="de-DE" sz="2000" dirty="0"/>
-              <a:t>Keine Fragen beantworten, welche durch den Systementwurf beantwortet werden</a:t>
-            </a:r>
+              <a:t>Keine Fragen beantworten, welche durch den Systementwurf beantwortet </a:t>
+            </a:r>
+            <a:r>
+              <a:rPr lang="de-DE" sz="2000" dirty="0" smtClean="0"/>
+              <a:t>werden können</a:t>
+            </a:r>
+            <a:endParaRPr lang="de-DE" sz="2000" dirty="0"/>
           </a:p>
           <a:p>
             <a:pPr marL="1066800" lvl="2" indent="-342900">
@@ -5590,6 +5677,10 @@
             <a:br>
               <a:rPr lang="de-DE" altLang="de-DE" dirty="0"/>
             </a:br>
+            <a:r>
+              <a:rPr lang="de-DE" altLang="de-DE" dirty="0"/>
+              <a:t/>
+            </a:r>
             <a:br>
               <a:rPr lang="de-DE" altLang="de-DE" dirty="0"/>
             </a:br>

</xml_diff>